<commit_message>
updating with newest presentation
</commit_message>
<xml_diff>
--- a/2021/2021-04-16-friday-training-python-101.pptx
+++ b/2021/2021-04-16-friday-training-python-101.pptx
@@ -369,7 +369,7 @@
           <a:p>
             <a:fld id="{B442ADD3-0C2D-49E8-BC2A-8F82586A0ECB}" type="datetimeFigureOut">
               <a:rPr lang="en-GB" smtClean="0"/>
-              <a:t>16/04/2021</a:t>
+              <a:t>24/05/2021</a:t>
             </a:fld>
             <a:endParaRPr lang="en-GB"/>
           </a:p>
@@ -546,7 +546,7 @@
           <a:p>
             <a:fld id="{D2DA50C0-49D4-4945-9D5D-054548C22B91}" type="datetimeFigureOut">
               <a:rPr lang="en-GB" smtClean="0"/>
-              <a:t>16/04/2021</a:t>
+              <a:t>24/05/2021</a:t>
             </a:fld>
             <a:endParaRPr lang="en-GB"/>
           </a:p>
@@ -1014,7 +1014,7 @@
           <a:p>
             <a:fld id="{083E4769-3E94-5841-B95D-79FC70CACDAD}" type="datetimeFigureOut">
               <a:rPr lang="en-US" smtClean="0"/>
-              <a:t>4/16/2021</a:t>
+              <a:t>5/24/2021</a:t>
             </a:fld>
             <a:endParaRPr lang="en-US"/>
           </a:p>
@@ -1358,7 +1358,7 @@
           <a:p>
             <a:fld id="{083E4769-3E94-5841-B95D-79FC70CACDAD}" type="datetimeFigureOut">
               <a:rPr lang="en-US" smtClean="0"/>
-              <a:t>4/16/2021</a:t>
+              <a:t>5/24/2021</a:t>
             </a:fld>
             <a:endParaRPr lang="en-US"/>
           </a:p>
@@ -1679,7 +1679,7 @@
           <a:p>
             <a:fld id="{083E4769-3E94-5841-B95D-79FC70CACDAD}" type="datetimeFigureOut">
               <a:rPr lang="en-US" smtClean="0"/>
-              <a:t>4/16/2021</a:t>
+              <a:t>5/24/2021</a:t>
             </a:fld>
             <a:endParaRPr lang="en-US"/>
           </a:p>
@@ -1852,7 +1852,7 @@
           <a:p>
             <a:fld id="{083E4769-3E94-5841-B95D-79FC70CACDAD}" type="datetimeFigureOut">
               <a:rPr lang="en-US" smtClean="0"/>
-              <a:t>4/16/2021</a:t>
+              <a:t>5/24/2021</a:t>
             </a:fld>
             <a:endParaRPr lang="en-US"/>
           </a:p>
@@ -1989,7 +1989,7 @@
           <a:p>
             <a:fld id="{083E4769-3E94-5841-B95D-79FC70CACDAD}" type="datetimeFigureOut">
               <a:rPr lang="en-US" smtClean="0"/>
-              <a:t>4/16/2021</a:t>
+              <a:t>5/24/2021</a:t>
             </a:fld>
             <a:endParaRPr lang="en-US"/>
           </a:p>
@@ -2594,7 +2594,7 @@
           <a:p>
             <a:fld id="{083E4769-3E94-5841-B95D-79FC70CACDAD}" type="datetimeFigureOut">
               <a:rPr lang="en-US" smtClean="0"/>
-              <a:t>4/16/2021</a:t>
+              <a:t>5/24/2021</a:t>
             </a:fld>
             <a:endParaRPr lang="en-US"/>
           </a:p>
@@ -2899,7 +2899,7 @@
           <a:p>
             <a:fld id="{083E4769-3E94-5841-B95D-79FC70CACDAD}" type="datetimeFigureOut">
               <a:rPr lang="en-US" smtClean="0"/>
-              <a:t>4/16/2021</a:t>
+              <a:t>5/24/2021</a:t>
             </a:fld>
             <a:endParaRPr lang="en-US"/>
           </a:p>
@@ -3202,7 +3202,7 @@
           <a:p>
             <a:fld id="{083E4769-3E94-5841-B95D-79FC70CACDAD}" type="datetimeFigureOut">
               <a:rPr lang="en-US" smtClean="0"/>
-              <a:t>4/16/2021</a:t>
+              <a:t>5/24/2021</a:t>
             </a:fld>
             <a:endParaRPr lang="en-US"/>
           </a:p>
@@ -3653,7 +3653,7 @@
           <a:p>
             <a:fld id="{083E4769-3E94-5841-B95D-79FC70CACDAD}" type="datetimeFigureOut">
               <a:rPr lang="en-US" smtClean="0"/>
-              <a:t>4/16/2021</a:t>
+              <a:t>5/24/2021</a:t>
             </a:fld>
             <a:endParaRPr lang="en-US"/>
           </a:p>
@@ -3826,7 +3826,7 @@
           <a:p>
             <a:fld id="{083E4769-3E94-5841-B95D-79FC70CACDAD}" type="datetimeFigureOut">
               <a:rPr lang="en-US" smtClean="0"/>
-              <a:t>4/16/2021</a:t>
+              <a:t>5/24/2021</a:t>
             </a:fld>
             <a:endParaRPr lang="en-US"/>
           </a:p>
@@ -7501,7 +7501,7 @@
           <p:nvPr>
             <p:extLst>
               <p:ext uri="{D42A27DB-BD31-4B8C-83A1-F6EECF244321}">
-                <p14:modId xmlns:p14="http://schemas.microsoft.com/office/powerpoint/2010/main" val="481821075"/>
+                <p14:modId xmlns:p14="http://schemas.microsoft.com/office/powerpoint/2010/main" val="3089881469"/>
               </p:ext>
             </p:extLst>
           </p:nvPr>
@@ -7540,7 +7540,7 @@
                     <a:p>
                       <a:r>
                         <a:rPr lang="en-GB" dirty="0"/>
-                        <a:t>Node</a:t>
+                        <a:t>Python</a:t>
                       </a:r>
                     </a:p>
                   </a:txBody>
@@ -7553,7 +7553,7 @@
                     <a:p>
                       <a:r>
                         <a:rPr lang="en-GB" dirty="0"/>
-                        <a:t>Python</a:t>
+                        <a:t>Node</a:t>
                       </a:r>
                     </a:p>
                   </a:txBody>
@@ -13913,7 +13913,7 @@
             </a:r>
             <a:r>
               <a:rPr lang="en-GB" sz="2800" b="1" dirty="0" err="1"/>
-              <a:t>spine_case</a:t>
+              <a:t>snake_case</a:t>
             </a:r>
             <a:r>
               <a:rPr lang="en-GB" sz="2800" b="1" dirty="0"/>

</xml_diff>